<commit_message>
More updates to PPT and Scatter Plot correctly saved as image
</commit_message>
<xml_diff>
--- a/Delay Analysis Team Delorean.pptx
+++ b/Delay Analysis Team Delorean.pptx
@@ -13,6 +13,18 @@
     <p:sldId id="259" r:id="rId7"/>
     <p:sldId id="263" r:id="rId8"/>
     <p:sldId id="264" r:id="rId9"/>
+    <p:sldId id="265" r:id="rId10"/>
+    <p:sldId id="266" r:id="rId11"/>
+    <p:sldId id="267" r:id="rId12"/>
+    <p:sldId id="268" r:id="rId13"/>
+    <p:sldId id="269" r:id="rId14"/>
+    <p:sldId id="270" r:id="rId15"/>
+    <p:sldId id="271" r:id="rId16"/>
+    <p:sldId id="272" r:id="rId17"/>
+    <p:sldId id="273" r:id="rId18"/>
+    <p:sldId id="274" r:id="rId19"/>
+    <p:sldId id="275" r:id="rId20"/>
+    <p:sldId id="276" r:id="rId21"/>
   </p:sldIdLst>
   <p:sldSz cx="12192000" cy="6858000"/>
   <p:notesSz cx="6858000" cy="9144000"/>
@@ -111,6 +123,11 @@
       </a:defRPr>
     </a:lvl9pPr>
   </p:defaultTextStyle>
+  <p:extLst>
+    <p:ext uri="{EFAFB233-063F-42B5-8137-9DF3F51BA10A}">
+      <p15:sldGuideLst xmlns:p15="http://schemas.microsoft.com/office/powerpoint/2012/main"/>
+    </p:ext>
+  </p:extLst>
 </p:presentation>
 </file>
 
@@ -4261,6 +4278,606 @@
 </p:sld>
 </file>
 
+<file path=ppt/slides/slide10.xml><?xml version="1.0" encoding="utf-8"?>
+<p:sld xmlns:a="http://schemas.openxmlformats.org/drawingml/2006/main" xmlns:r="http://schemas.openxmlformats.org/officeDocument/2006/relationships" xmlns:p="http://schemas.openxmlformats.org/presentationml/2006/main">
+  <p:cSld>
+    <p:spTree>
+      <p:nvGrpSpPr>
+        <p:cNvPr id="1" name=""/>
+        <p:cNvGrpSpPr/>
+        <p:nvPr/>
+      </p:nvGrpSpPr>
+      <p:grpSpPr>
+        <a:xfrm>
+          <a:off x="0" y="0"/>
+          <a:ext cx="0" cy="0"/>
+          <a:chOff x="0" y="0"/>
+          <a:chExt cx="0" cy="0"/>
+        </a:xfrm>
+      </p:grpSpPr>
+      <p:pic>
+        <p:nvPicPr>
+          <p:cNvPr id="2" name="Picture 1"/>
+          <p:cNvPicPr>
+            <a:picLocks noChangeAspect="1"/>
+          </p:cNvPicPr>
+          <p:nvPr/>
+        </p:nvPicPr>
+        <p:blipFill>
+          <a:blip r:embed="rId2">
+            <a:extLst>
+              <a:ext uri="{28A0092B-C50C-407E-A947-70E740481C1C}">
+                <a14:useLocalDpi xmlns:a14="http://schemas.microsoft.com/office/drawing/2010/main" val="0"/>
+              </a:ext>
+            </a:extLst>
+          </a:blip>
+          <a:stretch>
+            <a:fillRect/>
+          </a:stretch>
+        </p:blipFill>
+        <p:spPr>
+          <a:xfrm>
+            <a:off x="2520135" y="570849"/>
+            <a:ext cx="7151729" cy="5716302"/>
+          </a:xfrm>
+          <a:prstGeom prst="rect">
+            <a:avLst/>
+          </a:prstGeom>
+        </p:spPr>
+      </p:pic>
+    </p:spTree>
+    <p:extLst>
+      <p:ext uri="{BB962C8B-B14F-4D97-AF65-F5344CB8AC3E}">
+        <p14:creationId xmlns:p14="http://schemas.microsoft.com/office/powerpoint/2010/main" val="3665255972"/>
+      </p:ext>
+    </p:extLst>
+  </p:cSld>
+  <p:clrMapOvr>
+    <a:masterClrMapping/>
+  </p:clrMapOvr>
+</p:sld>
+</file>
+
+<file path=ppt/slides/slide11.xml><?xml version="1.0" encoding="utf-8"?>
+<p:sld xmlns:a="http://schemas.openxmlformats.org/drawingml/2006/main" xmlns:r="http://schemas.openxmlformats.org/officeDocument/2006/relationships" xmlns:p="http://schemas.openxmlformats.org/presentationml/2006/main">
+  <p:cSld>
+    <p:spTree>
+      <p:nvGrpSpPr>
+        <p:cNvPr id="1" name=""/>
+        <p:cNvGrpSpPr/>
+        <p:nvPr/>
+      </p:nvGrpSpPr>
+      <p:grpSpPr>
+        <a:xfrm>
+          <a:off x="0" y="0"/>
+          <a:ext cx="0" cy="0"/>
+          <a:chOff x="0" y="0"/>
+          <a:chExt cx="0" cy="0"/>
+        </a:xfrm>
+      </p:grpSpPr>
+      <p:pic>
+        <p:nvPicPr>
+          <p:cNvPr id="2" name="Picture 1"/>
+          <p:cNvPicPr>
+            <a:picLocks noChangeAspect="1"/>
+          </p:cNvPicPr>
+          <p:nvPr/>
+        </p:nvPicPr>
+        <p:blipFill>
+          <a:blip r:embed="rId2">
+            <a:extLst>
+              <a:ext uri="{28A0092B-C50C-407E-A947-70E740481C1C}">
+                <a14:useLocalDpi xmlns:a14="http://schemas.microsoft.com/office/drawing/2010/main" val="0"/>
+              </a:ext>
+            </a:extLst>
+          </a:blip>
+          <a:stretch>
+            <a:fillRect/>
+          </a:stretch>
+        </p:blipFill>
+        <p:spPr>
+          <a:xfrm>
+            <a:off x="2685273" y="634363"/>
+            <a:ext cx="6821454" cy="5589273"/>
+          </a:xfrm>
+          <a:prstGeom prst="rect">
+            <a:avLst/>
+          </a:prstGeom>
+        </p:spPr>
+      </p:pic>
+    </p:spTree>
+    <p:extLst>
+      <p:ext uri="{BB962C8B-B14F-4D97-AF65-F5344CB8AC3E}">
+        <p14:creationId xmlns:p14="http://schemas.microsoft.com/office/powerpoint/2010/main" val="1386785085"/>
+      </p:ext>
+    </p:extLst>
+  </p:cSld>
+  <p:clrMapOvr>
+    <a:masterClrMapping/>
+  </p:clrMapOvr>
+</p:sld>
+</file>
+
+<file path=ppt/slides/slide12.xml><?xml version="1.0" encoding="utf-8"?>
+<p:sld xmlns:a="http://schemas.openxmlformats.org/drawingml/2006/main" xmlns:r="http://schemas.openxmlformats.org/officeDocument/2006/relationships" xmlns:p="http://schemas.openxmlformats.org/presentationml/2006/main">
+  <p:cSld>
+    <p:spTree>
+      <p:nvGrpSpPr>
+        <p:cNvPr id="1" name=""/>
+        <p:cNvGrpSpPr/>
+        <p:nvPr/>
+      </p:nvGrpSpPr>
+      <p:grpSpPr>
+        <a:xfrm>
+          <a:off x="0" y="0"/>
+          <a:ext cx="0" cy="0"/>
+          <a:chOff x="0" y="0"/>
+          <a:chExt cx="0" cy="0"/>
+        </a:xfrm>
+      </p:grpSpPr>
+      <p:pic>
+        <p:nvPicPr>
+          <p:cNvPr id="2" name="Picture 1"/>
+          <p:cNvPicPr>
+            <a:picLocks noChangeAspect="1"/>
+          </p:cNvPicPr>
+          <p:nvPr/>
+        </p:nvPicPr>
+        <p:blipFill>
+          <a:blip r:embed="rId2">
+            <a:extLst>
+              <a:ext uri="{28A0092B-C50C-407E-A947-70E740481C1C}">
+                <a14:useLocalDpi xmlns:a14="http://schemas.microsoft.com/office/drawing/2010/main" val="0"/>
+              </a:ext>
+            </a:extLst>
+          </a:blip>
+          <a:stretch>
+            <a:fillRect/>
+          </a:stretch>
+        </p:blipFill>
+        <p:spPr>
+          <a:xfrm>
+            <a:off x="2932979" y="577200"/>
+            <a:ext cx="6326041" cy="5703599"/>
+          </a:xfrm>
+          <a:prstGeom prst="rect">
+            <a:avLst/>
+          </a:prstGeom>
+        </p:spPr>
+      </p:pic>
+    </p:spTree>
+    <p:extLst>
+      <p:ext uri="{BB962C8B-B14F-4D97-AF65-F5344CB8AC3E}">
+        <p14:creationId xmlns:p14="http://schemas.microsoft.com/office/powerpoint/2010/main" val="493122426"/>
+      </p:ext>
+    </p:extLst>
+  </p:cSld>
+  <p:clrMapOvr>
+    <a:masterClrMapping/>
+  </p:clrMapOvr>
+</p:sld>
+</file>
+
+<file path=ppt/slides/slide13.xml><?xml version="1.0" encoding="utf-8"?>
+<p:sld xmlns:a="http://schemas.openxmlformats.org/drawingml/2006/main" xmlns:r="http://schemas.openxmlformats.org/officeDocument/2006/relationships" xmlns:p="http://schemas.openxmlformats.org/presentationml/2006/main">
+  <p:cSld>
+    <p:spTree>
+      <p:nvGrpSpPr>
+        <p:cNvPr id="1" name=""/>
+        <p:cNvGrpSpPr/>
+        <p:nvPr/>
+      </p:nvGrpSpPr>
+      <p:grpSpPr>
+        <a:xfrm>
+          <a:off x="0" y="0"/>
+          <a:ext cx="0" cy="0"/>
+          <a:chOff x="0" y="0"/>
+          <a:chExt cx="0" cy="0"/>
+        </a:xfrm>
+      </p:grpSpPr>
+      <p:pic>
+        <p:nvPicPr>
+          <p:cNvPr id="2" name="Picture 1"/>
+          <p:cNvPicPr>
+            <a:picLocks noChangeAspect="1"/>
+          </p:cNvPicPr>
+          <p:nvPr/>
+        </p:nvPicPr>
+        <p:blipFill>
+          <a:blip r:embed="rId2">
+            <a:extLst>
+              <a:ext uri="{28A0092B-C50C-407E-A947-70E740481C1C}">
+                <a14:useLocalDpi xmlns:a14="http://schemas.microsoft.com/office/drawing/2010/main" val="0"/>
+              </a:ext>
+            </a:extLst>
+          </a:blip>
+          <a:stretch>
+            <a:fillRect/>
+          </a:stretch>
+        </p:blipFill>
+        <p:spPr>
+          <a:xfrm>
+            <a:off x="3110820" y="634363"/>
+            <a:ext cx="5970360" cy="5589273"/>
+          </a:xfrm>
+          <a:prstGeom prst="rect">
+            <a:avLst/>
+          </a:prstGeom>
+        </p:spPr>
+      </p:pic>
+    </p:spTree>
+    <p:extLst>
+      <p:ext uri="{BB962C8B-B14F-4D97-AF65-F5344CB8AC3E}">
+        <p14:creationId xmlns:p14="http://schemas.microsoft.com/office/powerpoint/2010/main" val="2691554377"/>
+      </p:ext>
+    </p:extLst>
+  </p:cSld>
+  <p:clrMapOvr>
+    <a:masterClrMapping/>
+  </p:clrMapOvr>
+</p:sld>
+</file>
+
+<file path=ppt/slides/slide14.xml><?xml version="1.0" encoding="utf-8"?>
+<p:sld xmlns:a="http://schemas.openxmlformats.org/drawingml/2006/main" xmlns:r="http://schemas.openxmlformats.org/officeDocument/2006/relationships" xmlns:p="http://schemas.openxmlformats.org/presentationml/2006/main">
+  <p:cSld>
+    <p:spTree>
+      <p:nvGrpSpPr>
+        <p:cNvPr id="1" name=""/>
+        <p:cNvGrpSpPr/>
+        <p:nvPr/>
+      </p:nvGrpSpPr>
+      <p:grpSpPr>
+        <a:xfrm>
+          <a:off x="0" y="0"/>
+          <a:ext cx="0" cy="0"/>
+          <a:chOff x="0" y="0"/>
+          <a:chExt cx="0" cy="0"/>
+        </a:xfrm>
+      </p:grpSpPr>
+      <p:pic>
+        <p:nvPicPr>
+          <p:cNvPr id="2" name="Picture 1"/>
+          <p:cNvPicPr>
+            <a:picLocks noChangeAspect="1"/>
+          </p:cNvPicPr>
+          <p:nvPr/>
+        </p:nvPicPr>
+        <p:blipFill>
+          <a:blip r:embed="rId2">
+            <a:extLst>
+              <a:ext uri="{28A0092B-C50C-407E-A947-70E740481C1C}">
+                <a14:useLocalDpi xmlns:a14="http://schemas.microsoft.com/office/drawing/2010/main" val="0"/>
+              </a:ext>
+            </a:extLst>
+          </a:blip>
+          <a:stretch>
+            <a:fillRect/>
+          </a:stretch>
+        </p:blipFill>
+        <p:spPr>
+          <a:xfrm>
+            <a:off x="3352175" y="1599783"/>
+            <a:ext cx="5487650" cy="3658433"/>
+          </a:xfrm>
+          <a:prstGeom prst="rect">
+            <a:avLst/>
+          </a:prstGeom>
+        </p:spPr>
+      </p:pic>
+    </p:spTree>
+    <p:extLst>
+      <p:ext uri="{BB962C8B-B14F-4D97-AF65-F5344CB8AC3E}">
+        <p14:creationId xmlns:p14="http://schemas.microsoft.com/office/powerpoint/2010/main" val="314562552"/>
+      </p:ext>
+    </p:extLst>
+  </p:cSld>
+  <p:clrMapOvr>
+    <a:masterClrMapping/>
+  </p:clrMapOvr>
+</p:sld>
+</file>
+
+<file path=ppt/slides/slide15.xml><?xml version="1.0" encoding="utf-8"?>
+<p:sld xmlns:a="http://schemas.openxmlformats.org/drawingml/2006/main" xmlns:r="http://schemas.openxmlformats.org/officeDocument/2006/relationships" xmlns:p="http://schemas.openxmlformats.org/presentationml/2006/main">
+  <p:cSld>
+    <p:spTree>
+      <p:nvGrpSpPr>
+        <p:cNvPr id="1" name=""/>
+        <p:cNvGrpSpPr/>
+        <p:nvPr/>
+      </p:nvGrpSpPr>
+      <p:grpSpPr>
+        <a:xfrm>
+          <a:off x="0" y="0"/>
+          <a:ext cx="0" cy="0"/>
+          <a:chOff x="0" y="0"/>
+          <a:chExt cx="0" cy="0"/>
+        </a:xfrm>
+      </p:grpSpPr>
+      <p:pic>
+        <p:nvPicPr>
+          <p:cNvPr id="2" name="Picture 1"/>
+          <p:cNvPicPr>
+            <a:picLocks noChangeAspect="1"/>
+          </p:cNvPicPr>
+          <p:nvPr/>
+        </p:nvPicPr>
+        <p:blipFill>
+          <a:blip r:embed="rId2">
+            <a:extLst>
+              <a:ext uri="{28A0092B-C50C-407E-A947-70E740481C1C}">
+                <a14:useLocalDpi xmlns:a14="http://schemas.microsoft.com/office/drawing/2010/main" val="0"/>
+              </a:ext>
+            </a:extLst>
+          </a:blip>
+          <a:stretch>
+            <a:fillRect/>
+          </a:stretch>
+        </p:blipFill>
+        <p:spPr>
+          <a:xfrm>
+            <a:off x="3352175" y="1599783"/>
+            <a:ext cx="5487650" cy="3658433"/>
+          </a:xfrm>
+          <a:prstGeom prst="rect">
+            <a:avLst/>
+          </a:prstGeom>
+        </p:spPr>
+      </p:pic>
+    </p:spTree>
+    <p:extLst>
+      <p:ext uri="{BB962C8B-B14F-4D97-AF65-F5344CB8AC3E}">
+        <p14:creationId xmlns:p14="http://schemas.microsoft.com/office/powerpoint/2010/main" val="3528615661"/>
+      </p:ext>
+    </p:extLst>
+  </p:cSld>
+  <p:clrMapOvr>
+    <a:masterClrMapping/>
+  </p:clrMapOvr>
+</p:sld>
+</file>
+
+<file path=ppt/slides/slide16.xml><?xml version="1.0" encoding="utf-8"?>
+<p:sld xmlns:a="http://schemas.openxmlformats.org/drawingml/2006/main" xmlns:r="http://schemas.openxmlformats.org/officeDocument/2006/relationships" xmlns:p="http://schemas.openxmlformats.org/presentationml/2006/main">
+  <p:cSld>
+    <p:spTree>
+      <p:nvGrpSpPr>
+        <p:cNvPr id="1" name=""/>
+        <p:cNvGrpSpPr/>
+        <p:nvPr/>
+      </p:nvGrpSpPr>
+      <p:grpSpPr>
+        <a:xfrm>
+          <a:off x="0" y="0"/>
+          <a:ext cx="0" cy="0"/>
+          <a:chOff x="0" y="0"/>
+          <a:chExt cx="0" cy="0"/>
+        </a:xfrm>
+      </p:grpSpPr>
+      <p:pic>
+        <p:nvPicPr>
+          <p:cNvPr id="2" name="Picture 1"/>
+          <p:cNvPicPr>
+            <a:picLocks noChangeAspect="1"/>
+          </p:cNvPicPr>
+          <p:nvPr/>
+        </p:nvPicPr>
+        <p:blipFill>
+          <a:blip r:embed="rId2">
+            <a:extLst>
+              <a:ext uri="{28A0092B-C50C-407E-A947-70E740481C1C}">
+                <a14:useLocalDpi xmlns:a14="http://schemas.microsoft.com/office/drawing/2010/main" val="0"/>
+              </a:ext>
+            </a:extLst>
+          </a:blip>
+          <a:stretch>
+            <a:fillRect/>
+          </a:stretch>
+        </p:blipFill>
+        <p:spPr>
+          <a:xfrm>
+            <a:off x="3352175" y="1599783"/>
+            <a:ext cx="5487650" cy="3658433"/>
+          </a:xfrm>
+          <a:prstGeom prst="rect">
+            <a:avLst/>
+          </a:prstGeom>
+        </p:spPr>
+      </p:pic>
+    </p:spTree>
+    <p:extLst>
+      <p:ext uri="{BB962C8B-B14F-4D97-AF65-F5344CB8AC3E}">
+        <p14:creationId xmlns:p14="http://schemas.microsoft.com/office/powerpoint/2010/main" val="590589741"/>
+      </p:ext>
+    </p:extLst>
+  </p:cSld>
+  <p:clrMapOvr>
+    <a:masterClrMapping/>
+  </p:clrMapOvr>
+</p:sld>
+</file>
+
+<file path=ppt/slides/slide17.xml><?xml version="1.0" encoding="utf-8"?>
+<p:sld xmlns:a="http://schemas.openxmlformats.org/drawingml/2006/main" xmlns:r="http://schemas.openxmlformats.org/officeDocument/2006/relationships" xmlns:p="http://schemas.openxmlformats.org/presentationml/2006/main">
+  <p:cSld>
+    <p:spTree>
+      <p:nvGrpSpPr>
+        <p:cNvPr id="1" name=""/>
+        <p:cNvGrpSpPr/>
+        <p:nvPr/>
+      </p:nvGrpSpPr>
+      <p:grpSpPr>
+        <a:xfrm>
+          <a:off x="0" y="0"/>
+          <a:ext cx="0" cy="0"/>
+          <a:chOff x="0" y="0"/>
+          <a:chExt cx="0" cy="0"/>
+        </a:xfrm>
+      </p:grpSpPr>
+      <p:pic>
+        <p:nvPicPr>
+          <p:cNvPr id="2" name="Picture 1"/>
+          <p:cNvPicPr>
+            <a:picLocks noChangeAspect="1"/>
+          </p:cNvPicPr>
+          <p:nvPr/>
+        </p:nvPicPr>
+        <p:blipFill>
+          <a:blip r:embed="rId2">
+            <a:extLst>
+              <a:ext uri="{28A0092B-C50C-407E-A947-70E740481C1C}">
+                <a14:useLocalDpi xmlns:a14="http://schemas.microsoft.com/office/drawing/2010/main" val="0"/>
+              </a:ext>
+            </a:extLst>
+          </a:blip>
+          <a:stretch>
+            <a:fillRect/>
+          </a:stretch>
+        </p:blipFill>
+        <p:spPr>
+          <a:xfrm>
+            <a:off x="3352175" y="1599783"/>
+            <a:ext cx="5487650" cy="3658433"/>
+          </a:xfrm>
+          <a:prstGeom prst="rect">
+            <a:avLst/>
+          </a:prstGeom>
+        </p:spPr>
+      </p:pic>
+    </p:spTree>
+    <p:extLst>
+      <p:ext uri="{BB962C8B-B14F-4D97-AF65-F5344CB8AC3E}">
+        <p14:creationId xmlns:p14="http://schemas.microsoft.com/office/powerpoint/2010/main" val="3076216066"/>
+      </p:ext>
+    </p:extLst>
+  </p:cSld>
+  <p:clrMapOvr>
+    <a:masterClrMapping/>
+  </p:clrMapOvr>
+</p:sld>
+</file>
+
+<file path=ppt/slides/slide18.xml><?xml version="1.0" encoding="utf-8"?>
+<p:sld xmlns:a="http://schemas.openxmlformats.org/drawingml/2006/main" xmlns:r="http://schemas.openxmlformats.org/officeDocument/2006/relationships" xmlns:p="http://schemas.openxmlformats.org/presentationml/2006/main">
+  <p:cSld>
+    <p:spTree>
+      <p:nvGrpSpPr>
+        <p:cNvPr id="1" name=""/>
+        <p:cNvGrpSpPr/>
+        <p:nvPr/>
+      </p:nvGrpSpPr>
+      <p:grpSpPr>
+        <a:xfrm>
+          <a:off x="0" y="0"/>
+          <a:ext cx="0" cy="0"/>
+          <a:chOff x="0" y="0"/>
+          <a:chExt cx="0" cy="0"/>
+        </a:xfrm>
+      </p:grpSpPr>
+      <p:pic>
+        <p:nvPicPr>
+          <p:cNvPr id="3" name="Picture 2"/>
+          <p:cNvPicPr>
+            <a:picLocks noChangeAspect="1"/>
+          </p:cNvPicPr>
+          <p:nvPr/>
+        </p:nvPicPr>
+        <p:blipFill>
+          <a:blip r:embed="rId2">
+            <a:extLst>
+              <a:ext uri="{28A0092B-C50C-407E-A947-70E740481C1C}">
+                <a14:useLocalDpi xmlns:a14="http://schemas.microsoft.com/office/drawing/2010/main" val="0"/>
+              </a:ext>
+            </a:extLst>
+          </a:blip>
+          <a:stretch>
+            <a:fillRect/>
+          </a:stretch>
+        </p:blipFill>
+        <p:spPr>
+          <a:xfrm>
+            <a:off x="0" y="381000"/>
+            <a:ext cx="10058400" cy="5029200"/>
+          </a:xfrm>
+          <a:prstGeom prst="rect">
+            <a:avLst/>
+          </a:prstGeom>
+        </p:spPr>
+      </p:pic>
+    </p:spTree>
+    <p:extLst>
+      <p:ext uri="{BB962C8B-B14F-4D97-AF65-F5344CB8AC3E}">
+        <p14:creationId xmlns:p14="http://schemas.microsoft.com/office/powerpoint/2010/main" val="3089084757"/>
+      </p:ext>
+    </p:extLst>
+  </p:cSld>
+  <p:clrMapOvr>
+    <a:masterClrMapping/>
+  </p:clrMapOvr>
+</p:sld>
+</file>
+
+<file path=ppt/slides/slide19.xml><?xml version="1.0" encoding="utf-8"?>
+<p:sld xmlns:a="http://schemas.openxmlformats.org/drawingml/2006/main" xmlns:r="http://schemas.openxmlformats.org/officeDocument/2006/relationships" xmlns:p="http://schemas.openxmlformats.org/presentationml/2006/main">
+  <p:cSld>
+    <p:spTree>
+      <p:nvGrpSpPr>
+        <p:cNvPr id="1" name=""/>
+        <p:cNvGrpSpPr/>
+        <p:nvPr/>
+      </p:nvGrpSpPr>
+      <p:grpSpPr>
+        <a:xfrm>
+          <a:off x="0" y="0"/>
+          <a:ext cx="0" cy="0"/>
+          <a:chOff x="0" y="0"/>
+          <a:chExt cx="0" cy="0"/>
+        </a:xfrm>
+      </p:grpSpPr>
+      <p:pic>
+        <p:nvPicPr>
+          <p:cNvPr id="2" name="Picture 1"/>
+          <p:cNvPicPr>
+            <a:picLocks noChangeAspect="1"/>
+          </p:cNvPicPr>
+          <p:nvPr/>
+        </p:nvPicPr>
+        <p:blipFill>
+          <a:blip r:embed="rId2">
+            <a:extLst>
+              <a:ext uri="{28A0092B-C50C-407E-A947-70E740481C1C}">
+                <a14:useLocalDpi xmlns:a14="http://schemas.microsoft.com/office/drawing/2010/main" val="0"/>
+              </a:ext>
+            </a:extLst>
+          </a:blip>
+          <a:stretch>
+            <a:fillRect/>
+          </a:stretch>
+        </p:blipFill>
+        <p:spPr>
+          <a:xfrm>
+            <a:off x="0" y="381000"/>
+            <a:ext cx="10058400" cy="5029200"/>
+          </a:xfrm>
+          <a:prstGeom prst="rect">
+            <a:avLst/>
+          </a:prstGeom>
+        </p:spPr>
+      </p:pic>
+    </p:spTree>
+    <p:extLst>
+      <p:ext uri="{BB962C8B-B14F-4D97-AF65-F5344CB8AC3E}">
+        <p14:creationId xmlns:p14="http://schemas.microsoft.com/office/powerpoint/2010/main" val="814327561"/>
+      </p:ext>
+    </p:extLst>
+  </p:cSld>
+  <p:clrMapOvr>
+    <a:masterClrMapping/>
+  </p:clrMapOvr>
+</p:sld>
+</file>
+
 <file path=ppt/slides/slide2.xml><?xml version="1.0" encoding="utf-8"?>
 <p:sld xmlns:a="http://schemas.openxmlformats.org/drawingml/2006/main" xmlns:r="http://schemas.openxmlformats.org/officeDocument/2006/relationships" xmlns:p="http://schemas.openxmlformats.org/presentationml/2006/main">
   <p:cSld>
@@ -5735,6 +6352,66 @@
     <p:extLst>
       <p:ext uri="{BB962C8B-B14F-4D97-AF65-F5344CB8AC3E}">
         <p14:creationId xmlns:p14="http://schemas.microsoft.com/office/powerpoint/2010/main" val="3860849440"/>
+      </p:ext>
+    </p:extLst>
+  </p:cSld>
+  <p:clrMapOvr>
+    <a:masterClrMapping/>
+  </p:clrMapOvr>
+</p:sld>
+</file>
+
+<file path=ppt/slides/slide20.xml><?xml version="1.0" encoding="utf-8"?>
+<p:sld xmlns:a="http://schemas.openxmlformats.org/drawingml/2006/main" xmlns:r="http://schemas.openxmlformats.org/officeDocument/2006/relationships" xmlns:p="http://schemas.openxmlformats.org/presentationml/2006/main">
+  <p:cSld>
+    <p:spTree>
+      <p:nvGrpSpPr>
+        <p:cNvPr id="1" name=""/>
+        <p:cNvGrpSpPr/>
+        <p:nvPr/>
+      </p:nvGrpSpPr>
+      <p:grpSpPr>
+        <a:xfrm>
+          <a:off x="0" y="0"/>
+          <a:ext cx="0" cy="0"/>
+          <a:chOff x="0" y="0"/>
+          <a:chExt cx="0" cy="0"/>
+        </a:xfrm>
+      </p:grpSpPr>
+      <p:pic>
+        <p:nvPicPr>
+          <p:cNvPr id="4" name="Picture 3"/>
+          <p:cNvPicPr>
+            <a:picLocks noChangeAspect="1"/>
+          </p:cNvPicPr>
+          <p:nvPr/>
+        </p:nvPicPr>
+        <p:blipFill>
+          <a:blip r:embed="rId2">
+            <a:extLst>
+              <a:ext uri="{28A0092B-C50C-407E-A947-70E740481C1C}">
+                <a14:useLocalDpi xmlns:a14="http://schemas.microsoft.com/office/drawing/2010/main" val="0"/>
+              </a:ext>
+            </a:extLst>
+          </a:blip>
+          <a:stretch>
+            <a:fillRect/>
+          </a:stretch>
+        </p:blipFill>
+        <p:spPr>
+          <a:xfrm>
+            <a:off x="1468459" y="739753"/>
+            <a:ext cx="5944954" cy="3531405"/>
+          </a:xfrm>
+          <a:prstGeom prst="rect">
+            <a:avLst/>
+          </a:prstGeom>
+        </p:spPr>
+      </p:pic>
+    </p:spTree>
+    <p:extLst>
+      <p:ext uri="{BB962C8B-B14F-4D97-AF65-F5344CB8AC3E}">
+        <p14:creationId xmlns:p14="http://schemas.microsoft.com/office/powerpoint/2010/main" val="1932446823"/>
       </p:ext>
     </p:extLst>
   </p:cSld>
@@ -5971,6 +6648,36 @@
           <a:chExt cx="0" cy="0"/>
         </a:xfrm>
       </p:grpSpPr>
+      <p:pic>
+        <p:nvPicPr>
+          <p:cNvPr id="2" name="Picture 1"/>
+          <p:cNvPicPr>
+            <a:picLocks noChangeAspect="1"/>
+          </p:cNvPicPr>
+          <p:nvPr/>
+        </p:nvPicPr>
+        <p:blipFill>
+          <a:blip r:embed="rId2">
+            <a:extLst>
+              <a:ext uri="{28A0092B-C50C-407E-A947-70E740481C1C}">
+                <a14:useLocalDpi xmlns:a14="http://schemas.microsoft.com/office/drawing/2010/main" val="0"/>
+              </a:ext>
+            </a:extLst>
+          </a:blip>
+          <a:stretch>
+            <a:fillRect/>
+          </a:stretch>
+        </p:blipFill>
+        <p:spPr>
+          <a:xfrm>
+            <a:off x="0" y="381000"/>
+            <a:ext cx="10058400" cy="5029200"/>
+          </a:xfrm>
+          <a:prstGeom prst="rect">
+            <a:avLst/>
+          </a:prstGeom>
+        </p:spPr>
+      </p:pic>
     </p:spTree>
     <p:extLst>
       <p:ext uri="{BB962C8B-B14F-4D97-AF65-F5344CB8AC3E}">
@@ -6001,6 +6708,36 @@
           <a:chExt cx="0" cy="0"/>
         </a:xfrm>
       </p:grpSpPr>
+      <p:pic>
+        <p:nvPicPr>
+          <p:cNvPr id="2" name="Picture 1"/>
+          <p:cNvPicPr>
+            <a:picLocks noChangeAspect="1"/>
+          </p:cNvPicPr>
+          <p:nvPr/>
+        </p:nvPicPr>
+        <p:blipFill>
+          <a:blip r:embed="rId2">
+            <a:extLst>
+              <a:ext uri="{28A0092B-C50C-407E-A947-70E740481C1C}">
+                <a14:useLocalDpi xmlns:a14="http://schemas.microsoft.com/office/drawing/2010/main" val="0"/>
+              </a:ext>
+            </a:extLst>
+          </a:blip>
+          <a:stretch>
+            <a:fillRect/>
+          </a:stretch>
+        </p:blipFill>
+        <p:spPr>
+          <a:xfrm>
+            <a:off x="0" y="381000"/>
+            <a:ext cx="10058400" cy="5029200"/>
+          </a:xfrm>
+          <a:prstGeom prst="rect">
+            <a:avLst/>
+          </a:prstGeom>
+        </p:spPr>
+      </p:pic>
     </p:spTree>
     <p:extLst>
       <p:ext uri="{BB962C8B-B14F-4D97-AF65-F5344CB8AC3E}">
@@ -6091,6 +6828,36 @@
           <a:chExt cx="0" cy="0"/>
         </a:xfrm>
       </p:grpSpPr>
+      <p:pic>
+        <p:nvPicPr>
+          <p:cNvPr id="2" name="Picture 1"/>
+          <p:cNvPicPr>
+            <a:picLocks noChangeAspect="1"/>
+          </p:cNvPicPr>
+          <p:nvPr/>
+        </p:nvPicPr>
+        <p:blipFill>
+          <a:blip r:embed="rId2">
+            <a:extLst>
+              <a:ext uri="{28A0092B-C50C-407E-A947-70E740481C1C}">
+                <a14:useLocalDpi xmlns:a14="http://schemas.microsoft.com/office/drawing/2010/main" val="0"/>
+              </a:ext>
+            </a:extLst>
+          </a:blip>
+          <a:stretch>
+            <a:fillRect/>
+          </a:stretch>
+        </p:blipFill>
+        <p:spPr>
+          <a:xfrm>
+            <a:off x="0" y="381000"/>
+            <a:ext cx="10058400" cy="5029200"/>
+          </a:xfrm>
+          <a:prstGeom prst="rect">
+            <a:avLst/>
+          </a:prstGeom>
+        </p:spPr>
+      </p:pic>
     </p:spTree>
     <p:extLst>
       <p:ext uri="{BB962C8B-B14F-4D97-AF65-F5344CB8AC3E}">
@@ -6160,10 +6927,100 @@
           </a:p>
         </p:txBody>
       </p:sp>
+      <p:pic>
+        <p:nvPicPr>
+          <p:cNvPr id="2" name="Picture 1"/>
+          <p:cNvPicPr>
+            <a:picLocks noChangeAspect="1"/>
+          </p:cNvPicPr>
+          <p:nvPr/>
+        </p:nvPicPr>
+        <p:blipFill>
+          <a:blip r:embed="rId2">
+            <a:extLst>
+              <a:ext uri="{28A0092B-C50C-407E-A947-70E740481C1C}">
+                <a14:useLocalDpi xmlns:a14="http://schemas.microsoft.com/office/drawing/2010/main" val="0"/>
+              </a:ext>
+            </a:extLst>
+          </a:blip>
+          <a:stretch>
+            <a:fillRect/>
+          </a:stretch>
+        </p:blipFill>
+        <p:spPr>
+          <a:xfrm>
+            <a:off x="0" y="381000"/>
+            <a:ext cx="10058400" cy="5029200"/>
+          </a:xfrm>
+          <a:prstGeom prst="rect">
+            <a:avLst/>
+          </a:prstGeom>
+        </p:spPr>
+      </p:pic>
     </p:spTree>
     <p:extLst>
       <p:ext uri="{BB962C8B-B14F-4D97-AF65-F5344CB8AC3E}">
         <p14:creationId xmlns:p14="http://schemas.microsoft.com/office/powerpoint/2010/main" val="2985141588"/>
+      </p:ext>
+    </p:extLst>
+  </p:cSld>
+  <p:clrMapOvr>
+    <a:masterClrMapping/>
+  </p:clrMapOvr>
+</p:sld>
+</file>
+
+<file path=ppt/slides/slide9.xml><?xml version="1.0" encoding="utf-8"?>
+<p:sld xmlns:a="http://schemas.openxmlformats.org/drawingml/2006/main" xmlns:r="http://schemas.openxmlformats.org/officeDocument/2006/relationships" xmlns:p="http://schemas.openxmlformats.org/presentationml/2006/main">
+  <p:cSld>
+    <p:spTree>
+      <p:nvGrpSpPr>
+        <p:cNvPr id="1" name=""/>
+        <p:cNvGrpSpPr/>
+        <p:nvPr/>
+      </p:nvGrpSpPr>
+      <p:grpSpPr>
+        <a:xfrm>
+          <a:off x="0" y="0"/>
+          <a:ext cx="0" cy="0"/>
+          <a:chOff x="0" y="0"/>
+          <a:chExt cx="0" cy="0"/>
+        </a:xfrm>
+      </p:grpSpPr>
+      <p:pic>
+        <p:nvPicPr>
+          <p:cNvPr id="2" name="Picture 1"/>
+          <p:cNvPicPr>
+            <a:picLocks noChangeAspect="1"/>
+          </p:cNvPicPr>
+          <p:nvPr/>
+        </p:nvPicPr>
+        <p:blipFill>
+          <a:blip r:embed="rId2">
+            <a:extLst>
+              <a:ext uri="{28A0092B-C50C-407E-A947-70E740481C1C}">
+                <a14:useLocalDpi xmlns:a14="http://schemas.microsoft.com/office/drawing/2010/main" val="0"/>
+              </a:ext>
+            </a:extLst>
+          </a:blip>
+          <a:stretch>
+            <a:fillRect/>
+          </a:stretch>
+        </p:blipFill>
+        <p:spPr>
+          <a:xfrm>
+            <a:off x="0" y="381000"/>
+            <a:ext cx="10058400" cy="5029200"/>
+          </a:xfrm>
+          <a:prstGeom prst="rect">
+            <a:avLst/>
+          </a:prstGeom>
+        </p:spPr>
+      </p:pic>
+    </p:spTree>
+    <p:extLst>
+      <p:ext uri="{BB962C8B-B14F-4D97-AF65-F5344CB8AC3E}">
+        <p14:creationId xmlns:p14="http://schemas.microsoft.com/office/powerpoint/2010/main" val="3867287040"/>
       </p:ext>
     </p:extLst>
   </p:cSld>

</xml_diff>

<commit_message>
All images loaded into PPT. Time to organize and add info for presentation
</commit_message>
<xml_diff>
--- a/Delay Analysis Team Delorean.pptx
+++ b/Delay Analysis Team Delorean.pptx
@@ -25,6 +25,8 @@
     <p:sldId id="274" r:id="rId19"/>
     <p:sldId id="275" r:id="rId20"/>
     <p:sldId id="276" r:id="rId21"/>
+    <p:sldId id="277" r:id="rId22"/>
+    <p:sldId id="278" r:id="rId23"/>
   </p:sldIdLst>
   <p:sldSz cx="12192000" cy="6858000"/>
   <p:notesSz cx="6858000" cy="9144000"/>
@@ -6421,6 +6423,126 @@
 </p:sld>
 </file>
 
+<file path=ppt/slides/slide21.xml><?xml version="1.0" encoding="utf-8"?>
+<p:sld xmlns:a="http://schemas.openxmlformats.org/drawingml/2006/main" xmlns:r="http://schemas.openxmlformats.org/officeDocument/2006/relationships" xmlns:p="http://schemas.openxmlformats.org/presentationml/2006/main">
+  <p:cSld>
+    <p:spTree>
+      <p:nvGrpSpPr>
+        <p:cNvPr id="1" name=""/>
+        <p:cNvGrpSpPr/>
+        <p:nvPr/>
+      </p:nvGrpSpPr>
+      <p:grpSpPr>
+        <a:xfrm>
+          <a:off x="0" y="0"/>
+          <a:ext cx="0" cy="0"/>
+          <a:chOff x="0" y="0"/>
+          <a:chExt cx="0" cy="0"/>
+        </a:xfrm>
+      </p:grpSpPr>
+      <p:pic>
+        <p:nvPicPr>
+          <p:cNvPr id="2" name="Picture 1"/>
+          <p:cNvPicPr>
+            <a:picLocks noChangeAspect="1"/>
+          </p:cNvPicPr>
+          <p:nvPr/>
+        </p:nvPicPr>
+        <p:blipFill>
+          <a:blip r:embed="rId2">
+            <a:extLst>
+              <a:ext uri="{28A0092B-C50C-407E-A947-70E740481C1C}">
+                <a14:useLocalDpi xmlns:a14="http://schemas.microsoft.com/office/drawing/2010/main" val="0"/>
+              </a:ext>
+            </a:extLst>
+          </a:blip>
+          <a:stretch>
+            <a:fillRect/>
+          </a:stretch>
+        </p:blipFill>
+        <p:spPr>
+          <a:xfrm>
+            <a:off x="3352175" y="1599783"/>
+            <a:ext cx="5487650" cy="3658433"/>
+          </a:xfrm>
+          <a:prstGeom prst="rect">
+            <a:avLst/>
+          </a:prstGeom>
+        </p:spPr>
+      </p:pic>
+    </p:spTree>
+    <p:extLst>
+      <p:ext uri="{BB962C8B-B14F-4D97-AF65-F5344CB8AC3E}">
+        <p14:creationId xmlns:p14="http://schemas.microsoft.com/office/powerpoint/2010/main" val="2007209943"/>
+      </p:ext>
+    </p:extLst>
+  </p:cSld>
+  <p:clrMapOvr>
+    <a:masterClrMapping/>
+  </p:clrMapOvr>
+</p:sld>
+</file>
+
+<file path=ppt/slides/slide22.xml><?xml version="1.0" encoding="utf-8"?>
+<p:sld xmlns:a="http://schemas.openxmlformats.org/drawingml/2006/main" xmlns:r="http://schemas.openxmlformats.org/officeDocument/2006/relationships" xmlns:p="http://schemas.openxmlformats.org/presentationml/2006/main">
+  <p:cSld>
+    <p:spTree>
+      <p:nvGrpSpPr>
+        <p:cNvPr id="1" name=""/>
+        <p:cNvGrpSpPr/>
+        <p:nvPr/>
+      </p:nvGrpSpPr>
+      <p:grpSpPr>
+        <a:xfrm>
+          <a:off x="0" y="0"/>
+          <a:ext cx="0" cy="0"/>
+          <a:chOff x="0" y="0"/>
+          <a:chExt cx="0" cy="0"/>
+        </a:xfrm>
+      </p:grpSpPr>
+      <p:pic>
+        <p:nvPicPr>
+          <p:cNvPr id="2" name="Picture 1"/>
+          <p:cNvPicPr>
+            <a:picLocks noChangeAspect="1"/>
+          </p:cNvPicPr>
+          <p:nvPr/>
+        </p:nvPicPr>
+        <p:blipFill>
+          <a:blip r:embed="rId2">
+            <a:extLst>
+              <a:ext uri="{28A0092B-C50C-407E-A947-70E740481C1C}">
+                <a14:useLocalDpi xmlns:a14="http://schemas.microsoft.com/office/drawing/2010/main" val="0"/>
+              </a:ext>
+            </a:extLst>
+          </a:blip>
+          <a:stretch>
+            <a:fillRect/>
+          </a:stretch>
+        </p:blipFill>
+        <p:spPr>
+          <a:xfrm>
+            <a:off x="3352175" y="1599783"/>
+            <a:ext cx="5487650" cy="3658433"/>
+          </a:xfrm>
+          <a:prstGeom prst="rect">
+            <a:avLst/>
+          </a:prstGeom>
+        </p:spPr>
+      </p:pic>
+    </p:spTree>
+    <p:extLst>
+      <p:ext uri="{BB962C8B-B14F-4D97-AF65-F5344CB8AC3E}">
+        <p14:creationId xmlns:p14="http://schemas.microsoft.com/office/powerpoint/2010/main" val="1242203560"/>
+      </p:ext>
+    </p:extLst>
+  </p:cSld>
+  <p:clrMapOvr>
+    <a:masterClrMapping/>
+  </p:clrMapOvr>
+</p:sld>
+</file>
+
 <file path=ppt/slides/slide3.xml><?xml version="1.0" encoding="utf-8"?>
 <p:sld xmlns:a="http://schemas.openxmlformats.org/drawingml/2006/main" xmlns:r="http://schemas.openxmlformats.org/officeDocument/2006/relationships" xmlns:p="http://schemas.openxmlformats.org/presentationml/2006/main">
   <p:cSld>

</xml_diff>

<commit_message>
Airport codes have a key and airport conclusion page added.
</commit_message>
<xml_diff>
--- a/Delay Analysis Team Delorean.pptx
+++ b/Delay Analysis Team Delorean.pptx
@@ -21,11 +21,12 @@
     <p:sldId id="266" r:id="rId15"/>
     <p:sldId id="267" r:id="rId16"/>
     <p:sldId id="270" r:id="rId17"/>
-    <p:sldId id="271" r:id="rId18"/>
-    <p:sldId id="282" r:id="rId19"/>
+    <p:sldId id="282" r:id="rId18"/>
+    <p:sldId id="271" r:id="rId19"/>
     <p:sldId id="283" r:id="rId20"/>
-    <p:sldId id="277" r:id="rId21"/>
-    <p:sldId id="284" r:id="rId22"/>
+    <p:sldId id="285" r:id="rId21"/>
+    <p:sldId id="277" r:id="rId22"/>
+    <p:sldId id="284" r:id="rId23"/>
   </p:sldIdLst>
   <p:sldSz cx="12192000" cy="6858000"/>
   <p:notesSz cx="6858000" cy="9144000"/>
@@ -500,7 +501,7 @@
             <a:fld id="{3C633830-2244-49AE-BC4A-47F415C177C6}" type="datetimeFigureOut">
               <a:rPr lang="en-US" dirty="0"/>
               <a:pPr/>
-              <a:t>10/8/18</a:t>
+              <a:t>10/10/2018</a:t>
             </a:fld>
             <a:endParaRPr lang="en-US" dirty="0"/>
           </a:p>
@@ -743,7 +744,7 @@
           <a:p>
             <a:fld id="{3C633830-2244-49AE-BC4A-47F415C177C6}" type="datetimeFigureOut">
               <a:rPr lang="en-US" dirty="0"/>
-              <a:t>10/8/18</a:t>
+              <a:t>10/10/2018</a:t>
             </a:fld>
             <a:endParaRPr lang="en-US" dirty="0"/>
           </a:p>
@@ -1124,7 +1125,7 @@
           <a:p>
             <a:fld id="{3C633830-2244-49AE-BC4A-47F415C177C6}" type="datetimeFigureOut">
               <a:rPr lang="en-US" dirty="0"/>
-              <a:t>10/8/18</a:t>
+              <a:t>10/10/2018</a:t>
             </a:fld>
             <a:endParaRPr lang="en-US" dirty="0"/>
           </a:p>
@@ -1348,7 +1349,7 @@
           <a:p>
             <a:fld id="{3C633830-2244-49AE-BC4A-47F415C177C6}" type="datetimeFigureOut">
               <a:rPr lang="en-US" dirty="0"/>
-              <a:t>10/8/18</a:t>
+              <a:t>10/10/2018</a:t>
             </a:fld>
             <a:endParaRPr lang="en-US" dirty="0"/>
           </a:p>
@@ -1835,7 +1836,7 @@
             <a:fld id="{3C633830-2244-49AE-BC4A-47F415C177C6}" type="datetimeFigureOut">
               <a:rPr lang="en-US" dirty="0"/>
               <a:pPr/>
-              <a:t>10/8/18</a:t>
+              <a:t>10/10/2018</a:t>
             </a:fld>
             <a:endParaRPr lang="en-US" dirty="0"/>
           </a:p>
@@ -2141,7 +2142,7 @@
           <a:p>
             <a:fld id="{3C633830-2244-49AE-BC4A-47F415C177C6}" type="datetimeFigureOut">
               <a:rPr lang="en-US" dirty="0"/>
-              <a:t>10/8/18</a:t>
+              <a:t>10/10/2018</a:t>
             </a:fld>
             <a:endParaRPr lang="en-US" dirty="0"/>
           </a:p>
@@ -2527,7 +2528,7 @@
           <a:p>
             <a:fld id="{3C633830-2244-49AE-BC4A-47F415C177C6}" type="datetimeFigureOut">
               <a:rPr lang="en-US" dirty="0"/>
-              <a:t>10/8/18</a:t>
+              <a:t>10/10/2018</a:t>
             </a:fld>
             <a:endParaRPr lang="en-US" dirty="0"/>
           </a:p>
@@ -2640,7 +2641,7 @@
           <a:p>
             <a:fld id="{3C633830-2244-49AE-BC4A-47F415C177C6}" type="datetimeFigureOut">
               <a:rPr lang="en-US" dirty="0"/>
-              <a:t>10/8/18</a:t>
+              <a:t>10/10/2018</a:t>
             </a:fld>
             <a:endParaRPr lang="en-US" dirty="0"/>
           </a:p>
@@ -2730,7 +2731,7 @@
           <a:p>
             <a:fld id="{3C633830-2244-49AE-BC4A-47F415C177C6}" type="datetimeFigureOut">
               <a:rPr lang="en-US" dirty="0"/>
-              <a:t>10/8/18</a:t>
+              <a:t>10/10/2018</a:t>
             </a:fld>
             <a:endParaRPr lang="en-US" dirty="0"/>
           </a:p>
@@ -3025,7 +3026,7 @@
           <a:p>
             <a:fld id="{3C633830-2244-49AE-BC4A-47F415C177C6}" type="datetimeFigureOut">
               <a:rPr lang="en-US" dirty="0"/>
-              <a:t>10/8/18</a:t>
+              <a:t>10/10/2018</a:t>
             </a:fld>
             <a:endParaRPr lang="en-US" dirty="0"/>
           </a:p>
@@ -3285,7 +3286,7 @@
           <a:p>
             <a:fld id="{3C633830-2244-49AE-BC4A-47F415C177C6}" type="datetimeFigureOut">
               <a:rPr lang="en-US" dirty="0"/>
-              <a:t>10/8/18</a:t>
+              <a:t>10/10/2018</a:t>
             </a:fld>
             <a:endParaRPr lang="en-US" dirty="0"/>
           </a:p>
@@ -3699,7 +3700,7 @@
             <a:fld id="{3C633830-2244-49AE-BC4A-47F415C177C6}" type="datetimeFigureOut">
               <a:rPr lang="en-US" dirty="0"/>
               <a:pPr/>
-              <a:t>10/8/18</a:t>
+              <a:t>10/10/2018</a:t>
             </a:fld>
             <a:endParaRPr lang="en-US" dirty="0"/>
           </a:p>
@@ -4299,7 +4300,7 @@
           <p:cNvPr id="4" name="Picture 3">
             <a:extLst>
               <a:ext uri="{FF2B5EF4-FFF2-40B4-BE49-F238E27FC236}">
-                <a16:creationId xmlns:a16="http://schemas.microsoft.com/office/drawing/2014/main" id="{444B296D-E3C5-504E-AC0D-86CE939C05CE}"/>
+                <a16:creationId xmlns:a16="http://schemas.microsoft.com/office/drawing/2014/main" xmlns="" id="{444B296D-E3C5-504E-AC0D-86CE939C05CE}"/>
               </a:ext>
             </a:extLst>
           </p:cNvPr>
@@ -4479,7 +4480,7 @@
           <p:cNvPr id="2" name="Title 1">
             <a:extLst>
               <a:ext uri="{FF2B5EF4-FFF2-40B4-BE49-F238E27FC236}">
-                <a16:creationId xmlns:a16="http://schemas.microsoft.com/office/drawing/2014/main" id="{7C222611-9D83-5949-A3EE-A2C85F9188B5}"/>
+                <a16:creationId xmlns:a16="http://schemas.microsoft.com/office/drawing/2014/main" xmlns="" id="{7C222611-9D83-5949-A3EE-A2C85F9188B5}"/>
               </a:ext>
             </a:extLst>
           </p:cNvPr>
@@ -4507,7 +4508,7 @@
           <p:cNvPr id="3" name="Content Placeholder 2">
             <a:extLst>
               <a:ext uri="{FF2B5EF4-FFF2-40B4-BE49-F238E27FC236}">
-                <a16:creationId xmlns:a16="http://schemas.microsoft.com/office/drawing/2014/main" id="{980265B2-E9CA-7A45-A18D-BAF577869FDF}"/>
+                <a16:creationId xmlns:a16="http://schemas.microsoft.com/office/drawing/2014/main" xmlns="" id="{980265B2-E9CA-7A45-A18D-BAF577869FDF}"/>
               </a:ext>
             </a:extLst>
           </p:cNvPr>
@@ -4610,7 +4611,7 @@
           <p:cNvPr id="3" name="Picture 2">
             <a:extLst>
               <a:ext uri="{FF2B5EF4-FFF2-40B4-BE49-F238E27FC236}">
-                <a16:creationId xmlns:a16="http://schemas.microsoft.com/office/drawing/2014/main" id="{8990E915-6A5B-094D-9CD0-D4592997B3FE}"/>
+                <a16:creationId xmlns:a16="http://schemas.microsoft.com/office/drawing/2014/main" xmlns="" id="{8990E915-6A5B-094D-9CD0-D4592997B3FE}"/>
               </a:ext>
             </a:extLst>
           </p:cNvPr>
@@ -4706,7 +4707,7 @@
           <p:cNvPr id="3" name="Picture 2">
             <a:extLst>
               <a:ext uri="{FF2B5EF4-FFF2-40B4-BE49-F238E27FC236}">
-                <a16:creationId xmlns:a16="http://schemas.microsoft.com/office/drawing/2014/main" id="{2265A21F-F27C-944D-9649-BC46F4ECBAF4}"/>
+                <a16:creationId xmlns:a16="http://schemas.microsoft.com/office/drawing/2014/main" xmlns="" id="{2265A21F-F27C-944D-9649-BC46F4ECBAF4}"/>
               </a:ext>
             </a:extLst>
           </p:cNvPr>
@@ -4742,7 +4743,7 @@
           <p:cNvPr id="4" name="Content Placeholder 2">
             <a:extLst>
               <a:ext uri="{FF2B5EF4-FFF2-40B4-BE49-F238E27FC236}">
-                <a16:creationId xmlns:a16="http://schemas.microsoft.com/office/drawing/2014/main" id="{D44B0A4D-BD32-5242-9C5B-FD1E25999FDA}"/>
+                <a16:creationId xmlns:a16="http://schemas.microsoft.com/office/drawing/2014/main" xmlns="" id="{D44B0A4D-BD32-5242-9C5B-FD1E25999FDA}"/>
               </a:ext>
             </a:extLst>
           </p:cNvPr>
@@ -5026,7 +5027,7 @@
           <p:cNvPr id="3" name="Picture 2">
             <a:extLst>
               <a:ext uri="{FF2B5EF4-FFF2-40B4-BE49-F238E27FC236}">
-                <a16:creationId xmlns:a16="http://schemas.microsoft.com/office/drawing/2014/main" id="{048A5D34-4FC0-6C4B-A4E4-6B051B71F605}"/>
+                <a16:creationId xmlns:a16="http://schemas.microsoft.com/office/drawing/2014/main" xmlns="" id="{048A5D34-4FC0-6C4B-A4E4-6B051B71F605}"/>
               </a:ext>
             </a:extLst>
           </p:cNvPr>
@@ -5057,6 +5058,176 @@
           </a:prstGeom>
         </p:spPr>
       </p:pic>
+      <p:sp>
+        <p:nvSpPr>
+          <p:cNvPr id="4" name="TextBox 3"/>
+          <p:cNvSpPr txBox="1"/>
+          <p:nvPr/>
+        </p:nvSpPr>
+        <p:spPr>
+          <a:xfrm>
+            <a:off x="371912" y="4233672"/>
+            <a:ext cx="3194248" cy="1908215"/>
+          </a:xfrm>
+          <a:prstGeom prst="rect">
+            <a:avLst/>
+          </a:prstGeom>
+          <a:noFill/>
+        </p:spPr>
+        <p:txBody>
+          <a:bodyPr wrap="square" rtlCol="0">
+            <a:spAutoFit/>
+          </a:bodyPr>
+          <a:lstStyle/>
+          <a:p>
+            <a:r>
+              <a:rPr lang="en-US" b="1" dirty="0" smtClean="0"/>
+              <a:t>Airport Codes Key:</a:t>
+            </a:r>
+          </a:p>
+          <a:p>
+            <a:r>
+              <a:rPr lang="en-US" sz="2000" dirty="0" smtClean="0"/>
+              <a:t>ISN: Williston, ND</a:t>
+            </a:r>
+          </a:p>
+          <a:p>
+            <a:r>
+              <a:rPr lang="en-US" sz="2000" dirty="0" smtClean="0"/>
+              <a:t>BMI: Bloomington, IN</a:t>
+            </a:r>
+          </a:p>
+          <a:p>
+            <a:r>
+              <a:rPr lang="en-US" sz="2000" dirty="0" smtClean="0"/>
+              <a:t>INL: International Falls, MN</a:t>
+            </a:r>
+          </a:p>
+          <a:p>
+            <a:r>
+              <a:rPr lang="en-US" sz="2000" dirty="0" smtClean="0"/>
+              <a:t>ABR: Aberdeen, SD</a:t>
+            </a:r>
+          </a:p>
+          <a:p>
+            <a:r>
+              <a:rPr lang="en-US" sz="2000" dirty="0" smtClean="0"/>
+              <a:t>HIB: Hibbing, MN</a:t>
+            </a:r>
+          </a:p>
+        </p:txBody>
+      </p:sp>
+      <p:sp>
+        <p:nvSpPr>
+          <p:cNvPr id="5" name="TextBox 4"/>
+          <p:cNvSpPr txBox="1"/>
+          <p:nvPr/>
+        </p:nvSpPr>
+        <p:spPr>
+          <a:xfrm>
+            <a:off x="3822192" y="4233672"/>
+            <a:ext cx="3483864" cy="1938992"/>
+          </a:xfrm>
+          <a:prstGeom prst="rect">
+            <a:avLst/>
+          </a:prstGeom>
+          <a:noFill/>
+        </p:spPr>
+        <p:txBody>
+          <a:bodyPr wrap="square" rtlCol="0">
+            <a:spAutoFit/>
+          </a:bodyPr>
+          <a:lstStyle/>
+          <a:p>
+            <a:r>
+              <a:rPr lang="en-US" sz="2000" dirty="0"/>
+              <a:t>LAN: Lansing, MI</a:t>
+            </a:r>
+          </a:p>
+          <a:p>
+            <a:r>
+              <a:rPr lang="en-US" sz="2000" dirty="0"/>
+              <a:t>IND: Indianapolis, IN</a:t>
+            </a:r>
+          </a:p>
+          <a:p>
+            <a:r>
+              <a:rPr lang="en-US" sz="2000" dirty="0"/>
+              <a:t>MSY: New Orleans, LA</a:t>
+            </a:r>
+          </a:p>
+          <a:p>
+            <a:r>
+              <a:rPr lang="en-US" sz="2000" dirty="0"/>
+              <a:t>BJI: Bemidji, MN</a:t>
+            </a:r>
+          </a:p>
+          <a:p>
+            <a:r>
+              <a:rPr lang="en-US" sz="2000" dirty="0"/>
+              <a:t>BRD: Brainerd, </a:t>
+            </a:r>
+            <a:r>
+              <a:rPr lang="en-US" sz="2000" dirty="0" smtClean="0"/>
+              <a:t>MN</a:t>
+            </a:r>
+          </a:p>
+          <a:p>
+            <a:r>
+              <a:rPr lang="en-US" sz="2000" dirty="0" smtClean="0"/>
+              <a:t>AUS: Austin, TX</a:t>
+            </a:r>
+            <a:endParaRPr lang="en-US" sz="2000" dirty="0"/>
+          </a:p>
+        </p:txBody>
+      </p:sp>
+      <p:sp>
+        <p:nvSpPr>
+          <p:cNvPr id="6" name="TextBox 5"/>
+          <p:cNvSpPr txBox="1"/>
+          <p:nvPr/>
+        </p:nvSpPr>
+        <p:spPr>
+          <a:xfrm>
+            <a:off x="6461760" y="4202895"/>
+            <a:ext cx="3483864" cy="1015663"/>
+          </a:xfrm>
+          <a:prstGeom prst="rect">
+            <a:avLst/>
+          </a:prstGeom>
+          <a:noFill/>
+        </p:spPr>
+        <p:txBody>
+          <a:bodyPr wrap="square" rtlCol="0">
+            <a:spAutoFit/>
+          </a:bodyPr>
+          <a:lstStyle/>
+          <a:p>
+            <a:r>
+              <a:rPr lang="en-US" sz="2000" dirty="0" smtClean="0"/>
+              <a:t>IMT: </a:t>
+            </a:r>
+            <a:r>
+              <a:rPr lang="en-US" sz="2000" dirty="0"/>
+              <a:t>Lansing, MI</a:t>
+            </a:r>
+          </a:p>
+          <a:p>
+            <a:r>
+              <a:rPr lang="en-US" sz="2000" dirty="0" smtClean="0"/>
+              <a:t>SLC: Salt Lake City, UT</a:t>
+            </a:r>
+            <a:endParaRPr lang="en-US" sz="2000" dirty="0"/>
+          </a:p>
+          <a:p>
+            <a:r>
+              <a:rPr lang="en-US" sz="2000" dirty="0" smtClean="0"/>
+              <a:t>ANC: Anchorage, AK</a:t>
+            </a:r>
+            <a:endParaRPr lang="en-US" sz="2000" dirty="0"/>
+          </a:p>
+        </p:txBody>
+      </p:sp>
     </p:spTree>
     <p:extLst>
       <p:ext uri="{BB962C8B-B14F-4D97-AF65-F5344CB8AC3E}">
@@ -5071,6 +5242,247 @@
 </file>
 
 <file path=ppt/slides/slide17.xml><?xml version="1.0" encoding="utf-8"?>
+<p:sld xmlns:a="http://schemas.openxmlformats.org/drawingml/2006/main" xmlns:r="http://schemas.openxmlformats.org/officeDocument/2006/relationships" xmlns:p="http://schemas.openxmlformats.org/presentationml/2006/main">
+  <p:cSld>
+    <p:spTree>
+      <p:nvGrpSpPr>
+        <p:cNvPr id="1" name=""/>
+        <p:cNvGrpSpPr/>
+        <p:nvPr/>
+      </p:nvGrpSpPr>
+      <p:grpSpPr>
+        <a:xfrm>
+          <a:off x="0" y="0"/>
+          <a:ext cx="0" cy="0"/>
+          <a:chOff x="0" y="0"/>
+          <a:chExt cx="0" cy="0"/>
+        </a:xfrm>
+      </p:grpSpPr>
+      <p:pic>
+        <p:nvPicPr>
+          <p:cNvPr id="3" name="Picture 2">
+            <a:extLst>
+              <a:ext uri="{FF2B5EF4-FFF2-40B4-BE49-F238E27FC236}">
+                <a16:creationId xmlns:a16="http://schemas.microsoft.com/office/drawing/2014/main" xmlns="" id="{0776B64F-AB54-7446-9C4E-190CA18A4C88}"/>
+              </a:ext>
+            </a:extLst>
+          </p:cNvPr>
+          <p:cNvPicPr>
+            <a:picLocks noChangeAspect="1"/>
+          </p:cNvPicPr>
+          <p:nvPr/>
+        </p:nvPicPr>
+        <p:blipFill>
+          <a:blip r:embed="rId2"/>
+          <a:stretch>
+            <a:fillRect/>
+          </a:stretch>
+        </p:blipFill>
+        <p:spPr>
+          <a:xfrm>
+            <a:off x="371912" y="211144"/>
+            <a:ext cx="5486400" cy="3657600"/>
+          </a:xfrm>
+          <a:prstGeom prst="rect">
+            <a:avLst/>
+          </a:prstGeom>
+        </p:spPr>
+      </p:pic>
+      <p:pic>
+        <p:nvPicPr>
+          <p:cNvPr id="4" name="Picture 3">
+            <a:extLst>
+              <a:ext uri="{FF2B5EF4-FFF2-40B4-BE49-F238E27FC236}">
+                <a16:creationId xmlns:a16="http://schemas.microsoft.com/office/drawing/2014/main" xmlns="" id="{4BF84504-9EAE-4643-BD0D-1D99C452A4E3}"/>
+              </a:ext>
+            </a:extLst>
+          </p:cNvPr>
+          <p:cNvPicPr>
+            <a:picLocks noChangeAspect="1"/>
+          </p:cNvPicPr>
+          <p:nvPr/>
+        </p:nvPicPr>
+        <p:blipFill>
+          <a:blip r:embed="rId3"/>
+          <a:stretch>
+            <a:fillRect/>
+          </a:stretch>
+        </p:blipFill>
+        <p:spPr>
+          <a:xfrm>
+            <a:off x="6352088" y="268296"/>
+            <a:ext cx="5486400" cy="3657600"/>
+          </a:xfrm>
+          <a:prstGeom prst="rect">
+            <a:avLst/>
+          </a:prstGeom>
+        </p:spPr>
+      </p:pic>
+      <p:sp>
+        <p:nvSpPr>
+          <p:cNvPr id="6" name="TextBox 5"/>
+          <p:cNvSpPr txBox="1"/>
+          <p:nvPr/>
+        </p:nvSpPr>
+        <p:spPr>
+          <a:xfrm>
+            <a:off x="371912" y="4031164"/>
+            <a:ext cx="3194248" cy="1908215"/>
+          </a:xfrm>
+          <a:prstGeom prst="rect">
+            <a:avLst/>
+          </a:prstGeom>
+          <a:noFill/>
+        </p:spPr>
+        <p:txBody>
+          <a:bodyPr wrap="square" rtlCol="0">
+            <a:spAutoFit/>
+          </a:bodyPr>
+          <a:lstStyle/>
+          <a:p>
+            <a:r>
+              <a:rPr lang="en-US" b="1" dirty="0" smtClean="0"/>
+              <a:t>Airport Codes Key:</a:t>
+            </a:r>
+          </a:p>
+          <a:p>
+            <a:r>
+              <a:rPr lang="en-US" sz="2000" dirty="0" smtClean="0"/>
+              <a:t>EWR: Newark, NJ</a:t>
+            </a:r>
+          </a:p>
+          <a:p>
+            <a:r>
+              <a:rPr lang="en-US" sz="2000" dirty="0" smtClean="0"/>
+              <a:t>RIC: Richmond, VA</a:t>
+            </a:r>
+          </a:p>
+          <a:p>
+            <a:r>
+              <a:rPr lang="en-US" sz="2000" dirty="0" smtClean="0"/>
+              <a:t>SFO: San Francisco, CA</a:t>
+            </a:r>
+          </a:p>
+          <a:p>
+            <a:r>
+              <a:rPr lang="en-US" sz="2000" dirty="0" smtClean="0"/>
+              <a:t>LGA: New York LaGuardia, NY</a:t>
+            </a:r>
+          </a:p>
+        </p:txBody>
+      </p:sp>
+      <p:sp>
+        <p:nvSpPr>
+          <p:cNvPr id="7" name="TextBox 6"/>
+          <p:cNvSpPr txBox="1"/>
+          <p:nvPr/>
+        </p:nvSpPr>
+        <p:spPr>
+          <a:xfrm>
+            <a:off x="3822192" y="4233672"/>
+            <a:ext cx="3483864" cy="1938992"/>
+          </a:xfrm>
+          <a:prstGeom prst="rect">
+            <a:avLst/>
+          </a:prstGeom>
+          <a:noFill/>
+        </p:spPr>
+        <p:txBody>
+          <a:bodyPr wrap="square" rtlCol="0">
+            <a:spAutoFit/>
+          </a:bodyPr>
+          <a:lstStyle/>
+          <a:p>
+            <a:r>
+              <a:rPr lang="en-US" sz="2000" dirty="0"/>
+              <a:t>JFK: New York John F. Kennedy, NY</a:t>
+            </a:r>
+          </a:p>
+          <a:p>
+            <a:r>
+              <a:rPr lang="en-US" sz="2000" dirty="0" smtClean="0"/>
+              <a:t>OKC: Oklahoma City, OK</a:t>
+            </a:r>
+          </a:p>
+          <a:p>
+            <a:r>
+              <a:rPr lang="en-US" sz="2000" dirty="0" smtClean="0"/>
+              <a:t>XNA: Bentonville, AK</a:t>
+            </a:r>
+          </a:p>
+          <a:p>
+            <a:r>
+              <a:rPr lang="en-US" sz="2000" dirty="0" smtClean="0"/>
+              <a:t>BOS: Boston, MA</a:t>
+            </a:r>
+            <a:endParaRPr lang="en-US" sz="2000" dirty="0"/>
+          </a:p>
+          <a:p>
+            <a:r>
+              <a:rPr lang="en-US" sz="2000" dirty="0" smtClean="0"/>
+              <a:t>MDW: Chicago Midway, IL</a:t>
+            </a:r>
+            <a:endParaRPr lang="en-US" sz="2000" dirty="0"/>
+          </a:p>
+        </p:txBody>
+      </p:sp>
+      <p:sp>
+        <p:nvSpPr>
+          <p:cNvPr id="8" name="TextBox 7"/>
+          <p:cNvSpPr txBox="1"/>
+          <p:nvPr/>
+        </p:nvSpPr>
+        <p:spPr>
+          <a:xfrm>
+            <a:off x="7165848" y="4233672"/>
+            <a:ext cx="3483864" cy="1015663"/>
+          </a:xfrm>
+          <a:prstGeom prst="rect">
+            <a:avLst/>
+          </a:prstGeom>
+          <a:noFill/>
+        </p:spPr>
+        <p:txBody>
+          <a:bodyPr wrap="square" rtlCol="0">
+            <a:spAutoFit/>
+          </a:bodyPr>
+          <a:lstStyle/>
+          <a:p>
+            <a:r>
+              <a:rPr lang="en-US" sz="2000" dirty="0"/>
+              <a:t>CLE: Cleveland, OH</a:t>
+            </a:r>
+          </a:p>
+          <a:p>
+            <a:r>
+              <a:rPr lang="en-US" sz="2000" dirty="0" smtClean="0"/>
+              <a:t>LAX: Los Angeles, CA</a:t>
+            </a:r>
+            <a:endParaRPr lang="en-US" sz="2000" dirty="0"/>
+          </a:p>
+          <a:p>
+            <a:r>
+              <a:rPr lang="en-US" sz="2000" dirty="0" smtClean="0"/>
+              <a:t>IAH: Houston, TX</a:t>
+            </a:r>
+            <a:endParaRPr lang="en-US" sz="2000" dirty="0"/>
+          </a:p>
+        </p:txBody>
+      </p:sp>
+    </p:spTree>
+    <p:extLst>
+      <p:ext uri="{BB962C8B-B14F-4D97-AF65-F5344CB8AC3E}">
+        <p14:creationId xmlns:p14="http://schemas.microsoft.com/office/powerpoint/2010/main" val="653027367"/>
+      </p:ext>
+    </p:extLst>
+  </p:cSld>
+  <p:clrMapOvr>
+    <a:masterClrMapping/>
+  </p:clrMapOvr>
+</p:sld>
+</file>
+
+<file path=ppt/slides/slide18.xml><?xml version="1.0" encoding="utf-8"?>
 <p:sld xmlns:a="http://schemas.openxmlformats.org/drawingml/2006/main" xmlns:r="http://schemas.openxmlformats.org/officeDocument/2006/relationships" xmlns:p="http://schemas.openxmlformats.org/presentationml/2006/main">
   <p:cSld>
     <p:spTree>
@@ -5122,7 +5534,7 @@
           <p:cNvPr id="3" name="Picture 2">
             <a:extLst>
               <a:ext uri="{FF2B5EF4-FFF2-40B4-BE49-F238E27FC236}">
-                <a16:creationId xmlns:a16="http://schemas.microsoft.com/office/drawing/2014/main" id="{8CF346E0-7A97-8C4C-8AC7-B7092C830A93}"/>
+                <a16:creationId xmlns:a16="http://schemas.microsoft.com/office/drawing/2014/main" xmlns="" id="{8CF346E0-7A97-8C4C-8AC7-B7092C830A93}"/>
               </a:ext>
             </a:extLst>
           </p:cNvPr>
@@ -5153,100 +5565,191 @@
           </a:prstGeom>
         </p:spPr>
       </p:pic>
+      <p:sp>
+        <p:nvSpPr>
+          <p:cNvPr id="4" name="TextBox 3"/>
+          <p:cNvSpPr txBox="1"/>
+          <p:nvPr/>
+        </p:nvSpPr>
+        <p:spPr>
+          <a:xfrm>
+            <a:off x="371912" y="4233672"/>
+            <a:ext cx="3194248" cy="1908215"/>
+          </a:xfrm>
+          <a:prstGeom prst="rect">
+            <a:avLst/>
+          </a:prstGeom>
+          <a:noFill/>
+        </p:spPr>
+        <p:txBody>
+          <a:bodyPr wrap="square" rtlCol="0">
+            <a:spAutoFit/>
+          </a:bodyPr>
+          <a:lstStyle/>
+          <a:p>
+            <a:r>
+              <a:rPr lang="en-US" b="1" dirty="0" smtClean="0"/>
+              <a:t>Airport Codes Key:</a:t>
+            </a:r>
+          </a:p>
+          <a:p>
+            <a:r>
+              <a:rPr lang="en-US" sz="2000" dirty="0" smtClean="0"/>
+              <a:t>BMI: Bloomington, IN</a:t>
+            </a:r>
+          </a:p>
+          <a:p>
+            <a:r>
+              <a:rPr lang="en-US" sz="2000" dirty="0" smtClean="0"/>
+              <a:t>GTF: Great Falls, MI</a:t>
+            </a:r>
+          </a:p>
+          <a:p>
+            <a:r>
+              <a:rPr lang="en-US" sz="2000" dirty="0" smtClean="0"/>
+              <a:t>PSC: Pasco, WA</a:t>
+            </a:r>
+          </a:p>
+          <a:p>
+            <a:r>
+              <a:rPr lang="en-US" sz="2000" dirty="0" smtClean="0"/>
+              <a:t>BIL: Billings, MT</a:t>
+            </a:r>
+          </a:p>
+          <a:p>
+            <a:r>
+              <a:rPr lang="en-US" sz="2000" dirty="0" smtClean="0"/>
+              <a:t>MSO: Missoula, MT</a:t>
+            </a:r>
+          </a:p>
+        </p:txBody>
+      </p:sp>
+      <p:sp>
+        <p:nvSpPr>
+          <p:cNvPr id="5" name="TextBox 4"/>
+          <p:cNvSpPr txBox="1"/>
+          <p:nvPr/>
+        </p:nvSpPr>
+        <p:spPr>
+          <a:xfrm>
+            <a:off x="3822192" y="4233672"/>
+            <a:ext cx="3483864" cy="1938992"/>
+          </a:xfrm>
+          <a:prstGeom prst="rect">
+            <a:avLst/>
+          </a:prstGeom>
+          <a:noFill/>
+        </p:spPr>
+        <p:txBody>
+          <a:bodyPr wrap="square" rtlCol="0">
+            <a:spAutoFit/>
+          </a:bodyPr>
+          <a:lstStyle/>
+          <a:p>
+            <a:r>
+              <a:rPr lang="en-US" sz="2000" dirty="0" smtClean="0"/>
+              <a:t>ICT: Wichita, KS</a:t>
+            </a:r>
+          </a:p>
+          <a:p>
+            <a:r>
+              <a:rPr lang="en-US" sz="2000" dirty="0" smtClean="0"/>
+              <a:t>LAN: Lansing, MI</a:t>
+            </a:r>
+          </a:p>
+          <a:p>
+            <a:r>
+              <a:rPr lang="en-US" sz="2000" dirty="0" smtClean="0"/>
+              <a:t>INL</a:t>
+            </a:r>
+            <a:r>
+              <a:rPr lang="en-US" sz="2000" dirty="0"/>
+              <a:t>: International Falls, MN</a:t>
+            </a:r>
+          </a:p>
+          <a:p>
+            <a:r>
+              <a:rPr lang="en-US" sz="2000" dirty="0" smtClean="0"/>
+              <a:t>TUL: Tulsa, OK</a:t>
+            </a:r>
+            <a:endParaRPr lang="en-US" sz="2000" dirty="0"/>
+          </a:p>
+          <a:p>
+            <a:r>
+              <a:rPr lang="en-US" sz="2000" dirty="0" smtClean="0"/>
+              <a:t>LSE: La Crosse, WI</a:t>
+            </a:r>
+          </a:p>
+          <a:p>
+            <a:r>
+              <a:rPr lang="en-US" sz="2000" dirty="0" smtClean="0"/>
+              <a:t>SJC: San Jose, CA</a:t>
+            </a:r>
+            <a:endParaRPr lang="en-US" sz="2000" dirty="0"/>
+          </a:p>
+        </p:txBody>
+      </p:sp>
+      <p:sp>
+        <p:nvSpPr>
+          <p:cNvPr id="7" name="TextBox 6"/>
+          <p:cNvSpPr txBox="1"/>
+          <p:nvPr/>
+        </p:nvSpPr>
+        <p:spPr>
+          <a:xfrm>
+            <a:off x="7165848" y="4233672"/>
+            <a:ext cx="3483864" cy="1631216"/>
+          </a:xfrm>
+          <a:prstGeom prst="rect">
+            <a:avLst/>
+          </a:prstGeom>
+          <a:noFill/>
+        </p:spPr>
+        <p:txBody>
+          <a:bodyPr wrap="square" rtlCol="0">
+            <a:spAutoFit/>
+          </a:bodyPr>
+          <a:lstStyle/>
+          <a:p>
+            <a:r>
+              <a:rPr lang="en-US" sz="2000" dirty="0" smtClean="0"/>
+              <a:t>ANC: Anchorage, AK</a:t>
+            </a:r>
+            <a:endParaRPr lang="en-US" sz="2000" dirty="0"/>
+          </a:p>
+          <a:p>
+            <a:r>
+              <a:rPr lang="en-US" sz="2000" dirty="0" smtClean="0"/>
+              <a:t>SMF: Sacramento, CA</a:t>
+            </a:r>
+            <a:endParaRPr lang="en-US" sz="2000" dirty="0"/>
+          </a:p>
+          <a:p>
+            <a:r>
+              <a:rPr lang="en-US" sz="2000" dirty="0" smtClean="0"/>
+              <a:t>SAN: San Diego, CA</a:t>
+            </a:r>
+            <a:endParaRPr lang="en-US" sz="2000" dirty="0"/>
+          </a:p>
+          <a:p>
+            <a:r>
+              <a:rPr lang="en-US" sz="2000" dirty="0" smtClean="0"/>
+              <a:t>RAP: Rapid City, MI</a:t>
+            </a:r>
+            <a:endParaRPr lang="en-US" sz="2000" dirty="0"/>
+          </a:p>
+          <a:p>
+            <a:r>
+              <a:rPr lang="en-US" sz="2000" dirty="0" smtClean="0"/>
+              <a:t>GEG: Spokane, WA</a:t>
+            </a:r>
+          </a:p>
+        </p:txBody>
+      </p:sp>
     </p:spTree>
     <p:extLst>
       <p:ext uri="{BB962C8B-B14F-4D97-AF65-F5344CB8AC3E}">
         <p14:creationId xmlns:p14="http://schemas.microsoft.com/office/powerpoint/2010/main" val="3528615661"/>
-      </p:ext>
-    </p:extLst>
-  </p:cSld>
-  <p:clrMapOvr>
-    <a:masterClrMapping/>
-  </p:clrMapOvr>
-</p:sld>
-</file>
-
-<file path=ppt/slides/slide18.xml><?xml version="1.0" encoding="utf-8"?>
-<p:sld xmlns:a="http://schemas.openxmlformats.org/drawingml/2006/main" xmlns:r="http://schemas.openxmlformats.org/officeDocument/2006/relationships" xmlns:p="http://schemas.openxmlformats.org/presentationml/2006/main">
-  <p:cSld>
-    <p:spTree>
-      <p:nvGrpSpPr>
-        <p:cNvPr id="1" name=""/>
-        <p:cNvGrpSpPr/>
-        <p:nvPr/>
-      </p:nvGrpSpPr>
-      <p:grpSpPr>
-        <a:xfrm>
-          <a:off x="0" y="0"/>
-          <a:ext cx="0" cy="0"/>
-          <a:chOff x="0" y="0"/>
-          <a:chExt cx="0" cy="0"/>
-        </a:xfrm>
-      </p:grpSpPr>
-      <p:pic>
-        <p:nvPicPr>
-          <p:cNvPr id="3" name="Picture 2">
-            <a:extLst>
-              <a:ext uri="{FF2B5EF4-FFF2-40B4-BE49-F238E27FC236}">
-                <a16:creationId xmlns:a16="http://schemas.microsoft.com/office/drawing/2014/main" id="{0776B64F-AB54-7446-9C4E-190CA18A4C88}"/>
-              </a:ext>
-            </a:extLst>
-          </p:cNvPr>
-          <p:cNvPicPr>
-            <a:picLocks noChangeAspect="1"/>
-          </p:cNvPicPr>
-          <p:nvPr/>
-        </p:nvPicPr>
-        <p:blipFill>
-          <a:blip r:embed="rId2"/>
-          <a:stretch>
-            <a:fillRect/>
-          </a:stretch>
-        </p:blipFill>
-        <p:spPr>
-          <a:xfrm>
-            <a:off x="1008611" y="586048"/>
-            <a:ext cx="5486400" cy="3657600"/>
-          </a:xfrm>
-          <a:prstGeom prst="rect">
-            <a:avLst/>
-          </a:prstGeom>
-        </p:spPr>
-      </p:pic>
-      <p:pic>
-        <p:nvPicPr>
-          <p:cNvPr id="5" name="Picture 4">
-            <a:extLst>
-              <a:ext uri="{FF2B5EF4-FFF2-40B4-BE49-F238E27FC236}">
-                <a16:creationId xmlns:a16="http://schemas.microsoft.com/office/drawing/2014/main" id="{5D3A6568-F565-3A4F-AE59-7A334E90AFFC}"/>
-              </a:ext>
-            </a:extLst>
-          </p:cNvPr>
-          <p:cNvPicPr>
-            <a:picLocks noChangeAspect="1"/>
-          </p:cNvPicPr>
-          <p:nvPr/>
-        </p:nvPicPr>
-        <p:blipFill>
-          <a:blip r:embed="rId3"/>
-          <a:stretch>
-            <a:fillRect/>
-          </a:stretch>
-        </p:blipFill>
-        <p:spPr>
-          <a:xfrm>
-            <a:off x="6345752" y="586048"/>
-            <a:ext cx="5486400" cy="3657600"/>
-          </a:xfrm>
-          <a:prstGeom prst="rect">
-            <a:avLst/>
-          </a:prstGeom>
-        </p:spPr>
-      </p:pic>
-    </p:spTree>
-    <p:extLst>
-      <p:ext uri="{BB962C8B-B14F-4D97-AF65-F5344CB8AC3E}">
-        <p14:creationId xmlns:p14="http://schemas.microsoft.com/office/powerpoint/2010/main" val="653027367"/>
       </p:ext>
     </p:extLst>
   </p:cSld>
@@ -5275,10 +5778,10 @@
       </p:grpSpPr>
       <p:pic>
         <p:nvPicPr>
-          <p:cNvPr id="3" name="Picture 2">
+          <p:cNvPr id="5" name="Picture 4">
             <a:extLst>
               <a:ext uri="{FF2B5EF4-FFF2-40B4-BE49-F238E27FC236}">
-                <a16:creationId xmlns:a16="http://schemas.microsoft.com/office/drawing/2014/main" id="{4BF84504-9EAE-4643-BD0D-1D99C452A4E3}"/>
+                <a16:creationId xmlns:a16="http://schemas.microsoft.com/office/drawing/2014/main" xmlns="" id="{147EC9DE-1D4C-294F-A200-9B3E09EDE728}"/>
               </a:ext>
             </a:extLst>
           </p:cNvPr>
@@ -5295,7 +5798,7 @@
         </p:blipFill>
         <p:spPr>
           <a:xfrm>
-            <a:off x="343593" y="719422"/>
+            <a:off x="289100" y="435958"/>
             <a:ext cx="5486400" cy="3657600"/>
           </a:xfrm>
           <a:prstGeom prst="rect">
@@ -5305,10 +5808,10 @@
       </p:pic>
       <p:pic>
         <p:nvPicPr>
-          <p:cNvPr id="5" name="Picture 4">
+          <p:cNvPr id="4" name="Picture 3">
             <a:extLst>
               <a:ext uri="{FF2B5EF4-FFF2-40B4-BE49-F238E27FC236}">
-                <a16:creationId xmlns:a16="http://schemas.microsoft.com/office/drawing/2014/main" id="{147EC9DE-1D4C-294F-A200-9B3E09EDE728}"/>
+                <a16:creationId xmlns:a16="http://schemas.microsoft.com/office/drawing/2014/main" xmlns="" id="{5D3A6568-F565-3A4F-AE59-7A334E90AFFC}"/>
               </a:ext>
             </a:extLst>
           </p:cNvPr>
@@ -5325,7 +5828,7 @@
         </p:blipFill>
         <p:spPr>
           <a:xfrm>
-            <a:off x="6196124" y="719422"/>
+            <a:off x="6250988" y="435958"/>
             <a:ext cx="5486400" cy="3657600"/>
           </a:xfrm>
           <a:prstGeom prst="rect">
@@ -5333,6 +5836,157 @@
           </a:prstGeom>
         </p:spPr>
       </p:pic>
+      <p:sp>
+        <p:nvSpPr>
+          <p:cNvPr id="6" name="TextBox 5"/>
+          <p:cNvSpPr txBox="1"/>
+          <p:nvPr/>
+        </p:nvSpPr>
+        <p:spPr>
+          <a:xfrm>
+            <a:off x="371912" y="4233672"/>
+            <a:ext cx="3194248" cy="1908215"/>
+          </a:xfrm>
+          <a:prstGeom prst="rect">
+            <a:avLst/>
+          </a:prstGeom>
+          <a:noFill/>
+        </p:spPr>
+        <p:txBody>
+          <a:bodyPr wrap="square" rtlCol="0">
+            <a:spAutoFit/>
+          </a:bodyPr>
+          <a:lstStyle/>
+          <a:p>
+            <a:r>
+              <a:rPr lang="en-US" b="1" dirty="0" smtClean="0"/>
+              <a:t>Airport Codes Key:</a:t>
+            </a:r>
+          </a:p>
+          <a:p>
+            <a:r>
+              <a:rPr lang="en-US" sz="2000" dirty="0" smtClean="0"/>
+              <a:t>MSY: New Orleans, LA</a:t>
+            </a:r>
+          </a:p>
+          <a:p>
+            <a:r>
+              <a:rPr lang="en-US" sz="2000" dirty="0" smtClean="0"/>
+              <a:t>LAX: Los Angeles, CA</a:t>
+            </a:r>
+          </a:p>
+          <a:p>
+            <a:r>
+              <a:rPr lang="en-US" sz="2000" dirty="0" smtClean="0"/>
+              <a:t>EWR: Newark, NJ</a:t>
+            </a:r>
+          </a:p>
+          <a:p>
+            <a:r>
+              <a:rPr lang="en-US" sz="2000" dirty="0" smtClean="0"/>
+              <a:t>XNA: Bentonville, AK</a:t>
+            </a:r>
+          </a:p>
+          <a:p>
+            <a:r>
+              <a:rPr lang="en-US" sz="2000" dirty="0" smtClean="0"/>
+              <a:t>BOS: Boston, MA</a:t>
+            </a:r>
+          </a:p>
+        </p:txBody>
+      </p:sp>
+      <p:sp>
+        <p:nvSpPr>
+          <p:cNvPr id="7" name="TextBox 6"/>
+          <p:cNvSpPr txBox="1"/>
+          <p:nvPr/>
+        </p:nvSpPr>
+        <p:spPr>
+          <a:xfrm>
+            <a:off x="3493008" y="4233672"/>
+            <a:ext cx="3483864" cy="1938992"/>
+          </a:xfrm>
+          <a:prstGeom prst="rect">
+            <a:avLst/>
+          </a:prstGeom>
+          <a:noFill/>
+        </p:spPr>
+        <p:txBody>
+          <a:bodyPr wrap="square" rtlCol="0">
+            <a:spAutoFit/>
+          </a:bodyPr>
+          <a:lstStyle/>
+          <a:p>
+            <a:r>
+              <a:rPr lang="en-US" sz="2000" dirty="0" smtClean="0"/>
+              <a:t>MDW: Chicago Midway, IL</a:t>
+            </a:r>
+          </a:p>
+          <a:p>
+            <a:r>
+              <a:rPr lang="en-US" sz="2000" dirty="0" smtClean="0"/>
+              <a:t>JFK: New York John F. Kennedy, NY</a:t>
+            </a:r>
+          </a:p>
+          <a:p>
+            <a:r>
+              <a:rPr lang="en-US" sz="2000" dirty="0" smtClean="0"/>
+              <a:t>LGA: New York LaGuardia, NY</a:t>
+            </a:r>
+            <a:endParaRPr lang="en-US" sz="2000" dirty="0"/>
+          </a:p>
+          <a:p>
+            <a:r>
+              <a:rPr lang="en-US" sz="2000" dirty="0" smtClean="0"/>
+              <a:t>ATL: Atlanta, GA</a:t>
+            </a:r>
+            <a:endParaRPr lang="en-US" sz="2000" dirty="0"/>
+          </a:p>
+          <a:p>
+            <a:r>
+              <a:rPr lang="en-US" sz="2000" dirty="0" smtClean="0"/>
+              <a:t>SFO: San Francisco, CA</a:t>
+            </a:r>
+          </a:p>
+        </p:txBody>
+      </p:sp>
+      <p:sp>
+        <p:nvSpPr>
+          <p:cNvPr id="8" name="TextBox 7"/>
+          <p:cNvSpPr txBox="1"/>
+          <p:nvPr/>
+        </p:nvSpPr>
+        <p:spPr>
+          <a:xfrm>
+            <a:off x="7165848" y="4233672"/>
+            <a:ext cx="3483864" cy="707886"/>
+          </a:xfrm>
+          <a:prstGeom prst="rect">
+            <a:avLst/>
+          </a:prstGeom>
+          <a:noFill/>
+        </p:spPr>
+        <p:txBody>
+          <a:bodyPr wrap="square" rtlCol="0">
+            <a:spAutoFit/>
+          </a:bodyPr>
+          <a:lstStyle/>
+          <a:p>
+            <a:r>
+              <a:rPr lang="en-US" sz="2000" dirty="0" smtClean="0"/>
+              <a:t>FLL: Fort Lauderdale, FL</a:t>
+            </a:r>
+            <a:endParaRPr lang="en-US" sz="2000" dirty="0"/>
+          </a:p>
+          <a:p>
+            <a:r>
+              <a:rPr lang="en-US" sz="2000" dirty="0" smtClean="0"/>
+              <a:t>RIC: Richmond, VA</a:t>
+            </a:r>
+            <a:endParaRPr lang="en-US" sz="2000" dirty="0"/>
+          </a:p>
+        </p:txBody>
+      </p:sp>
     </p:spTree>
     <p:extLst>
       <p:ext uri="{BB962C8B-B14F-4D97-AF65-F5344CB8AC3E}">
@@ -6750,6 +7404,114 @@
 </file>
 
 <file path=ppt/slides/slide20.xml><?xml version="1.0" encoding="utf-8"?>
+<p:sld xmlns:a="http://schemas.openxmlformats.org/drawingml/2006/main" xmlns:r="http://schemas.openxmlformats.org/officeDocument/2006/relationships" xmlns:p="http://schemas.openxmlformats.org/presentationml/2006/main">
+  <p:cSld>
+    <p:spTree>
+      <p:nvGrpSpPr>
+        <p:cNvPr id="1" name=""/>
+        <p:cNvGrpSpPr/>
+        <p:nvPr/>
+      </p:nvGrpSpPr>
+      <p:grpSpPr>
+        <a:xfrm>
+          <a:off x="0" y="0"/>
+          <a:ext cx="0" cy="0"/>
+          <a:chOff x="0" y="0"/>
+          <a:chExt cx="0" cy="0"/>
+        </a:xfrm>
+      </p:grpSpPr>
+      <p:sp>
+        <p:nvSpPr>
+          <p:cNvPr id="2" name="Title 1">
+            <a:extLst>
+              <a:ext uri="{FF2B5EF4-FFF2-40B4-BE49-F238E27FC236}">
+                <a16:creationId xmlns:a16="http://schemas.microsoft.com/office/drawing/2014/main" xmlns="" id="{7C222611-9D83-5949-A3EE-A2C85F9188B5}"/>
+              </a:ext>
+            </a:extLst>
+          </p:cNvPr>
+          <p:cNvSpPr>
+            <a:spLocks noGrp="1"/>
+          </p:cNvSpPr>
+          <p:nvPr>
+            <p:ph type="title"/>
+          </p:nvPr>
+        </p:nvSpPr>
+        <p:spPr/>
+        <p:txBody>
+          <a:bodyPr/>
+          <a:lstStyle/>
+          <a:p>
+            <a:r>
+              <a:rPr lang="en-US" dirty="0" smtClean="0"/>
+              <a:t>Airport </a:t>
+            </a:r>
+            <a:r>
+              <a:rPr lang="en-US" dirty="0"/>
+              <a:t>Conclusions</a:t>
+            </a:r>
+          </a:p>
+        </p:txBody>
+      </p:sp>
+      <p:sp>
+        <p:nvSpPr>
+          <p:cNvPr id="3" name="Content Placeholder 2">
+            <a:extLst>
+              <a:ext uri="{FF2B5EF4-FFF2-40B4-BE49-F238E27FC236}">
+                <a16:creationId xmlns:a16="http://schemas.microsoft.com/office/drawing/2014/main" xmlns="" id="{980265B2-E9CA-7A45-A18D-BAF577869FDF}"/>
+              </a:ext>
+            </a:extLst>
+          </p:cNvPr>
+          <p:cNvSpPr>
+            <a:spLocks noGrp="1"/>
+          </p:cNvSpPr>
+          <p:nvPr>
+            <p:ph idx="1"/>
+          </p:nvPr>
+        </p:nvSpPr>
+        <p:spPr/>
+        <p:txBody>
+          <a:bodyPr/>
+          <a:lstStyle/>
+          <a:p>
+            <a:r>
+              <a:rPr lang="en-US" dirty="0" smtClean="0"/>
+              <a:t>Smaller stations are the best ones to fly in and out of to avoid delays</a:t>
+            </a:r>
+            <a:endParaRPr lang="en-US" dirty="0"/>
+          </a:p>
+          <a:p>
+            <a:r>
+              <a:rPr lang="en-US" dirty="0" smtClean="0"/>
+              <a:t>There is a congregation of NE airports that have higher percentages of delays both out of and to MSP</a:t>
+            </a:r>
+            <a:endParaRPr lang="en-US" dirty="0"/>
+          </a:p>
+          <a:p>
+            <a:r>
+              <a:rPr lang="en-US" dirty="0" smtClean="0"/>
+              <a:t>The top ten for the best and the worst for both outbound and inbound are pretty consistent</a:t>
+            </a:r>
+            <a:endParaRPr lang="en-US" dirty="0"/>
+          </a:p>
+          <a:p>
+            <a:endParaRPr lang="en-US" dirty="0"/>
+          </a:p>
+        </p:txBody>
+      </p:sp>
+    </p:spTree>
+    <p:extLst>
+      <p:ext uri="{BB962C8B-B14F-4D97-AF65-F5344CB8AC3E}">
+        <p14:creationId xmlns:p14="http://schemas.microsoft.com/office/powerpoint/2010/main" val="1050057375"/>
+      </p:ext>
+    </p:extLst>
+  </p:cSld>
+  <p:clrMapOvr>
+    <a:masterClrMapping/>
+  </p:clrMapOvr>
+</p:sld>
+</file>
+
+<file path=ppt/slides/slide21.xml><?xml version="1.0" encoding="utf-8"?>
 <p:sld xmlns:a="http://schemas.openxmlformats.org/drawingml/2006/main" xmlns:r="http://schemas.openxmlformats.org/officeDocument/2006/relationships" xmlns:p="http://schemas.openxmlformats.org/presentationml/2006/main">
   <p:cSld>
     <p:spTree>
@@ -6801,7 +7563,7 @@
           <p:cNvPr id="3" name="Picture 2">
             <a:extLst>
               <a:ext uri="{FF2B5EF4-FFF2-40B4-BE49-F238E27FC236}">
-                <a16:creationId xmlns:a16="http://schemas.microsoft.com/office/drawing/2014/main" id="{FF279ECC-26E1-984D-B0D1-9D437615C70D}"/>
+                <a16:creationId xmlns:a16="http://schemas.microsoft.com/office/drawing/2014/main" xmlns="" id="{FF279ECC-26E1-984D-B0D1-9D437615C70D}"/>
               </a:ext>
             </a:extLst>
           </p:cNvPr>
@@ -6845,7 +7607,7 @@
 </p:sld>
 </file>
 
-<file path=ppt/slides/slide21.xml><?xml version="1.0" encoding="utf-8"?>
+<file path=ppt/slides/slide22.xml><?xml version="1.0" encoding="utf-8"?>
 <p:sld xmlns:a="http://schemas.openxmlformats.org/drawingml/2006/main" xmlns:r="http://schemas.openxmlformats.org/officeDocument/2006/relationships" xmlns:p="http://schemas.openxmlformats.org/presentationml/2006/main">
   <p:cSld>
     <p:spTree>
@@ -6867,7 +7629,7 @@
           <p:cNvPr id="2" name="Title 1">
             <a:extLst>
               <a:ext uri="{FF2B5EF4-FFF2-40B4-BE49-F238E27FC236}">
-                <a16:creationId xmlns:a16="http://schemas.microsoft.com/office/drawing/2014/main" id="{27FBC86B-35E6-B040-9EB7-935763A8688E}"/>
+                <a16:creationId xmlns:a16="http://schemas.microsoft.com/office/drawing/2014/main" xmlns="" id="{27FBC86B-35E6-B040-9EB7-935763A8688E}"/>
               </a:ext>
             </a:extLst>
           </p:cNvPr>
@@ -6895,7 +7657,7 @@
           <p:cNvPr id="3" name="Content Placeholder 2">
             <a:extLst>
               <a:ext uri="{FF2B5EF4-FFF2-40B4-BE49-F238E27FC236}">
-                <a16:creationId xmlns:a16="http://schemas.microsoft.com/office/drawing/2014/main" id="{04618FF0-E74D-874C-90D7-22C5A04592DD}"/>
+                <a16:creationId xmlns:a16="http://schemas.microsoft.com/office/drawing/2014/main" xmlns="" id="{04618FF0-E74D-874C-90D7-22C5A04592DD}"/>
               </a:ext>
             </a:extLst>
           </p:cNvPr>
@@ -7215,7 +7977,7 @@
           <p:cNvPr id="4" name="Picture 3">
             <a:extLst>
               <a:ext uri="{FF2B5EF4-FFF2-40B4-BE49-F238E27FC236}">
-                <a16:creationId xmlns:a16="http://schemas.microsoft.com/office/drawing/2014/main" id="{CAC8D578-E064-5C4B-AB83-6E7E65753AEC}"/>
+                <a16:creationId xmlns:a16="http://schemas.microsoft.com/office/drawing/2014/main" xmlns="" id="{CAC8D578-E064-5C4B-AB83-6E7E65753AEC}"/>
               </a:ext>
             </a:extLst>
           </p:cNvPr>
@@ -7275,7 +8037,7 @@
           <p:cNvPr id="3" name="Picture 2">
             <a:extLst>
               <a:ext uri="{FF2B5EF4-FFF2-40B4-BE49-F238E27FC236}">
-                <a16:creationId xmlns:a16="http://schemas.microsoft.com/office/drawing/2014/main" id="{434A2044-4643-D340-B648-05C9A71FE0EF}"/>
+                <a16:creationId xmlns:a16="http://schemas.microsoft.com/office/drawing/2014/main" xmlns="" id="{434A2044-4643-D340-B648-05C9A71FE0EF}"/>
               </a:ext>
             </a:extLst>
           </p:cNvPr>
@@ -7434,7 +8196,7 @@
           <p:cNvPr id="2" name="Title 1">
             <a:extLst>
               <a:ext uri="{FF2B5EF4-FFF2-40B4-BE49-F238E27FC236}">
-                <a16:creationId xmlns:a16="http://schemas.microsoft.com/office/drawing/2014/main" id="{7C222611-9D83-5949-A3EE-A2C85F9188B5}"/>
+                <a16:creationId xmlns:a16="http://schemas.microsoft.com/office/drawing/2014/main" xmlns="" id="{7C222611-9D83-5949-A3EE-A2C85F9188B5}"/>
               </a:ext>
             </a:extLst>
           </p:cNvPr>
@@ -7462,7 +8224,7 @@
           <p:cNvPr id="3" name="Content Placeholder 2">
             <a:extLst>
               <a:ext uri="{FF2B5EF4-FFF2-40B4-BE49-F238E27FC236}">
-                <a16:creationId xmlns:a16="http://schemas.microsoft.com/office/drawing/2014/main" id="{980265B2-E9CA-7A45-A18D-BAF577869FDF}"/>
+                <a16:creationId xmlns:a16="http://schemas.microsoft.com/office/drawing/2014/main" xmlns="" id="{980265B2-E9CA-7A45-A18D-BAF577869FDF}"/>
               </a:ext>
             </a:extLst>
           </p:cNvPr>

</xml_diff>